<commit_message>
removed newlines from hashed values
</commit_message>
<xml_diff>
--- a/presentation/Sentiment Analysis.pptx
+++ b/presentation/Sentiment Analysis.pptx
@@ -15,23 +15,24 @@
     <p:sldId id="260" r:id="rId10"/>
     <p:sldId id="261" r:id="rId11"/>
     <p:sldId id="262" r:id="rId12"/>
+    <p:sldId id="263" r:id="rId13"/>
   </p:sldIdLst>
   <p:sldSz cy="5143500" cx="9144000"/>
   <p:notesSz cx="6858000" cy="9144000"/>
   <p:embeddedFontLst>
     <p:embeddedFont>
       <p:font typeface="Economica"/>
-      <p:regular r:id="rId13"/>
-      <p:bold r:id="rId14"/>
-      <p:italic r:id="rId15"/>
-      <p:boldItalic r:id="rId16"/>
+      <p:regular r:id="rId14"/>
+      <p:bold r:id="rId15"/>
+      <p:italic r:id="rId16"/>
+      <p:boldItalic r:id="rId17"/>
     </p:embeddedFont>
     <p:embeddedFont>
       <p:font typeface="Open Sans"/>
-      <p:regular r:id="rId17"/>
-      <p:bold r:id="rId18"/>
-      <p:italic r:id="rId19"/>
-      <p:boldItalic r:id="rId20"/>
+      <p:regular r:id="rId18"/>
+      <p:bold r:id="rId19"/>
+      <p:italic r:id="rId20"/>
+      <p:boldItalic r:id="rId21"/>
     </p:embeddedFont>
   </p:embeddedFontLst>
   <p:defaultTextStyle>
@@ -927,7 +928,7 @@
   <p:cSld>
     <p:spTree>
       <p:nvGrpSpPr>
-        <p:cNvPr id="91" name="Shape 91"/>
+        <p:cNvPr id="90" name="Shape 90"/>
         <p:cNvGrpSpPr/>
         <p:nvPr/>
       </p:nvGrpSpPr>
@@ -941,7 +942,7 @@
       </p:grpSpPr>
       <p:sp>
         <p:nvSpPr>
-          <p:cNvPr id="92" name="Shape 92"/>
+          <p:cNvPr id="91" name="Shape 91"/>
           <p:cNvSpPr/>
           <p:nvPr>
             <p:ph idx="2" type="sldImg"/>
@@ -985,7 +986,7 @@
       </p:sp>
       <p:sp>
         <p:nvSpPr>
-          <p:cNvPr id="93" name="Shape 93"/>
+          <p:cNvPr id="92" name="Shape 92"/>
           <p:cNvSpPr txBox="1"/>
           <p:nvPr>
             <p:ph idx="1" type="body"/>
@@ -1091,6 +1092,111 @@
       <p:sp>
         <p:nvSpPr>
           <p:cNvPr id="99" name="Shape 99"/>
+          <p:cNvSpPr txBox="1"/>
+          <p:nvPr>
+            <p:ph idx="1" type="body"/>
+          </p:nvPr>
+        </p:nvSpPr>
+        <p:spPr>
+          <a:xfrm>
+            <a:off x="685800" y="4343400"/>
+            <a:ext cx="5486399" cy="4114800"/>
+          </a:xfrm>
+          <a:prstGeom prst="rect">
+            <a:avLst/>
+          </a:prstGeom>
+        </p:spPr>
+        <p:txBody>
+          <a:bodyPr anchorCtr="0" anchor="t" bIns="91425" lIns="91425" rIns="91425" tIns="91425">
+            <a:noAutofit/>
+          </a:bodyPr>
+          <a:lstStyle/>
+          <a:p>
+            <a:pPr>
+              <a:spcBef>
+                <a:spcPts val="0"/>
+              </a:spcBef>
+              <a:buNone/>
+            </a:pPr>
+            <a:r>
+              <a:t/>
+            </a:r>
+            <a:endParaRPr/>
+          </a:p>
+        </p:txBody>
+      </p:sp>
+    </p:spTree>
+  </p:cSld>
+  <p:clrMapOvr>
+    <a:masterClrMapping/>
+  </p:clrMapOvr>
+</p:notes>
+</file>
+
+<file path=ppt/notesSlides/notesSlide8.xml><?xml version="1.0" encoding="utf-8"?>
+<p:notes xmlns:a="http://schemas.openxmlformats.org/drawingml/2006/main" xmlns:r="http://schemas.openxmlformats.org/officeDocument/2006/relationships" xmlns:mc="http://schemas.openxmlformats.org/markup-compatibility/2006" xmlns:mv="urn:schemas-microsoft-com:mac:vml" xmlns:p="http://schemas.openxmlformats.org/presentationml/2006/main" xmlns:c="http://schemas.openxmlformats.org/drawingml/2006/chart" xmlns:dgm="http://schemas.openxmlformats.org/drawingml/2006/diagram" xmlns:o="urn:schemas-microsoft-com:office:office" xmlns:v="urn:schemas-microsoft-com:vml" xmlns:pvml="urn:schemas-microsoft-com:office:powerpoint" xmlns:com="http://schemas.openxmlformats.org/drawingml/2006/compatibility" xmlns:p14="http://schemas.microsoft.com/office/powerpoint/2010/main" showMasterPhAnim="0" showMasterSp="0">
+  <p:cSld>
+    <p:spTree>
+      <p:nvGrpSpPr>
+        <p:cNvPr id="103" name="Shape 103"/>
+        <p:cNvGrpSpPr/>
+        <p:nvPr/>
+      </p:nvGrpSpPr>
+      <p:grpSpPr>
+        <a:xfrm>
+          <a:off x="0" y="0"/>
+          <a:ext cx="0" cy="0"/>
+          <a:chOff x="0" y="0"/>
+          <a:chExt cx="0" cy="0"/>
+        </a:xfrm>
+      </p:grpSpPr>
+      <p:sp>
+        <p:nvSpPr>
+          <p:cNvPr id="104" name="Shape 104"/>
+          <p:cNvSpPr/>
+          <p:nvPr>
+            <p:ph idx="2" type="sldImg"/>
+          </p:nvPr>
+        </p:nvSpPr>
+        <p:spPr>
+          <a:xfrm>
+            <a:off x="381300" y="685800"/>
+            <a:ext cx="6096000" cy="3429000"/>
+          </a:xfrm>
+          <a:custGeom>
+            <a:pathLst>
+              <a:path extrusionOk="0" h="120000" w="120000">
+                <a:moveTo>
+                  <a:pt x="0" y="0"/>
+                </a:moveTo>
+                <a:lnTo>
+                  <a:pt x="120000" y="0"/>
+                </a:lnTo>
+                <a:lnTo>
+                  <a:pt x="120000" y="120000"/>
+                </a:lnTo>
+                <a:lnTo>
+                  <a:pt x="0" y="120000"/>
+                </a:lnTo>
+                <a:close/>
+              </a:path>
+            </a:pathLst>
+          </a:custGeom>
+          <a:noFill/>
+          <a:ln cap="flat" cmpd="sng" w="9525">
+            <a:solidFill>
+              <a:srgbClr val="000000"/>
+            </a:solidFill>
+            <a:prstDash val="solid"/>
+            <a:round/>
+            <a:headEnd len="med" w="med" type="none"/>
+            <a:tailEnd len="med" w="med" type="none"/>
+          </a:ln>
+        </p:spPr>
+      </p:sp>
+      <p:sp>
+        <p:nvSpPr>
+          <p:cNvPr id="105" name="Shape 105"/>
           <p:cNvSpPr txBox="1"/>
           <p:nvPr>
             <p:ph idx="1" type="body"/>
@@ -5754,23 +5860,7 @@
             </a:pPr>
             <a:r>
               <a:rPr lang="en"/>
-              <a:t>Sentiment Analysis: </a:t>
-            </a:r>
-            <a:r>
-              <a:rPr lang="en">
-                <a:solidFill>
-                  <a:srgbClr val="4A86E8"/>
-                </a:solidFill>
-              </a:rPr>
-              <a:t>My</a:t>
-            </a:r>
-            <a:r>
-              <a:rPr lang="en">
-                <a:solidFill>
-                  <a:srgbClr val="FF9900"/>
-                </a:solidFill>
-              </a:rPr>
-              <a:t>SQL</a:t>
+              <a:t>Output</a:t>
             </a:r>
           </a:p>
         </p:txBody>
@@ -5798,104 +5888,109 @@
           </a:bodyPr>
           <a:lstStyle/>
           <a:p>
-            <a:pPr indent="-228600" lvl="0" marL="457200" rtl="0">
-              <a:spcBef>
-                <a:spcPts val="0"/>
-              </a:spcBef>
-              <a:buChar char="➔"/>
+            <a:pPr rtl="0">
+              <a:spcBef>
+                <a:spcPts val="0"/>
+              </a:spcBef>
+              <a:buNone/>
             </a:pPr>
             <a:r>
               <a:rPr lang="en"/>
-              <a:t>As per instructions, only schema and query implemented</a:t>
-            </a:r>
-          </a:p>
-          <a:p>
-            <a:pPr indent="-228600" lvl="0" marL="457200" rtl="0">
-              <a:spcBef>
-                <a:spcPts val="0"/>
-              </a:spcBef>
-              <a:buChar char="➔"/>
+              <a:t>Given review:</a:t>
+            </a:r>
+          </a:p>
+          <a:p>
+            <a:pPr rtl="0" algn="ctr">
+              <a:spcBef>
+                <a:spcPts val="0"/>
+              </a:spcBef>
+              <a:buNone/>
+            </a:pPr>
+            <a:r>
+              <a:rPr lang="en" sz="1200"/>
+              <a:t>I saw this film about 20 years ago and remember it as being particularly nasty. I believe it is based on a true incident: a young man breaks into a nurses' home and rapes, tortures and kills various women.It is in black and white but saves the colour for one shocking shot.At the end the film seems to be trying to make some political statement but it just comes across as confused and obscene. Avoid.</a:t>
+            </a:r>
+          </a:p>
+          <a:p>
+            <a:pPr rtl="0" algn="ctr">
+              <a:spcBef>
+                <a:spcPts val="0"/>
+              </a:spcBef>
+              <a:buNone/>
+            </a:pPr>
+            <a:r>
+              <a:t/>
+            </a:r>
+            <a:endParaRPr sz="1200"/>
+          </a:p>
+          <a:p>
+            <a:pPr rtl="0" algn="l">
+              <a:spcBef>
+                <a:spcPts val="0"/>
+              </a:spcBef>
+              <a:buNone/>
             </a:pPr>
             <a:r>
               <a:rPr lang="en"/>
-              <a:t>Code would be required to build the database from the JSON and txt files provided</a:t>
-            </a:r>
-          </a:p>
-          <a:p>
-            <a:pPr indent="-228600" lvl="0" marL="457200" rtl="0">
-              <a:spcBef>
-                <a:spcPts val="0"/>
-              </a:spcBef>
-              <a:buChar char="➔"/>
-            </a:pPr>
-            <a:r>
-              <a:rPr lang="en"/>
-              <a:t>Schema very simple:</a:t>
-            </a:r>
-          </a:p>
-          <a:p>
-            <a:pPr indent="-228600" lvl="1" marL="914400" rtl="0">
-              <a:spcBef>
-                <a:spcPts val="0"/>
-              </a:spcBef>
-              <a:buChar char="◆"/>
-            </a:pPr>
-            <a:r>
-              <a:rPr lang="en"/>
-              <a:t>id and review content for each review</a:t>
-            </a:r>
-          </a:p>
-          <a:p>
-            <a:pPr indent="-228600" lvl="1" marL="914400" rtl="0">
-              <a:spcBef>
-                <a:spcPts val="0"/>
-              </a:spcBef>
-              <a:buChar char="◆"/>
-            </a:pPr>
-            <a:r>
-              <a:rPr lang="en"/>
-              <a:t>id foreign key, the word, and its count for each word</a:t>
-            </a:r>
-          </a:p>
-          <a:p>
-            <a:pPr indent="-228600" lvl="1" marL="914400" rtl="0">
-              <a:spcBef>
-                <a:spcPts val="0"/>
-              </a:spcBef>
-              <a:buChar char="◆"/>
-            </a:pPr>
-            <a:r>
-              <a:rPr lang="en"/>
-              <a:t>sentiment value and word for each sentiment word (from * words.txt)</a:t>
-            </a:r>
-          </a:p>
-          <a:p>
-            <a:pPr indent="-228600" lvl="0" marL="457200" rtl="0">
-              <a:spcBef>
-                <a:spcPts val="0"/>
-              </a:spcBef>
-              <a:buChar char="➔"/>
-            </a:pPr>
-            <a:r>
-              <a:rPr lang="en"/>
-              <a:t>After this, </a:t>
-            </a:r>
-            <a:r>
-              <a:rPr b="1" lang="en"/>
-              <a:t>all of the code can be performed in SQL</a:t>
-            </a:r>
-          </a:p>
-          <a:p>
-            <a:pPr indent="-228600" lvl="0" marL="457200">
-              <a:spcBef>
-                <a:spcPts val="0"/>
-              </a:spcBef>
-              <a:buChar char="➔"/>
-            </a:pPr>
-            <a:r>
-              <a:rPr b="1" lang="en"/>
-              <a:t>~3 lines for the SQL query</a:t>
-            </a:r>
+              <a:t>We output, into a .json file:</a:t>
+            </a:r>
+          </a:p>
+          <a:p>
+            <a:pPr lvl="0" rtl="0" algn="l">
+              <a:spcBef>
+                <a:spcPts val="0"/>
+              </a:spcBef>
+              <a:buClr>
+                <a:schemeClr val="dk1"/>
+              </a:buClr>
+              <a:buSzPct val="91666"/>
+              <a:buFont typeface="Arial"/>
+              <a:buNone/>
+            </a:pPr>
+            <a:r>
+              <a:rPr lang="en" sz="1200"/>
+              <a:t>{"id":"\"45057_0\"","review":"\"I saw this film about 20 years ago and remember it as being particularly nasty. I believe it is based on a true incident: a young man breaks into a nurses' home and rapes, tortures and kills various women.It is in black and white but saves the colour for one shocking shot.At the end the film seems to be trying to make some political statement but it just comes across as confused and obscene.Avoid.\"","category":"negative"}</a:t>
+            </a:r>
+          </a:p>
+          <a:p>
+            <a:pPr lvl="0" rtl="0" algn="l">
+              <a:spcBef>
+                <a:spcPts val="0"/>
+              </a:spcBef>
+              <a:buClr>
+                <a:schemeClr val="dk1"/>
+              </a:buClr>
+              <a:buFont typeface="Arial"/>
+              <a:buNone/>
+            </a:pPr>
+            <a:r>
+              <a:t/>
+            </a:r>
+            <a:endParaRPr sz="1200"/>
+          </a:p>
+          <a:p>
+            <a:pPr rtl="0" algn="l">
+              <a:spcBef>
+                <a:spcPts val="0"/>
+              </a:spcBef>
+              <a:buNone/>
+            </a:pPr>
+            <a:r>
+              <a:t/>
+            </a:r>
+            <a:endParaRPr sz="1200"/>
+          </a:p>
+          <a:p>
+            <a:pPr algn="l">
+              <a:spcBef>
+                <a:spcPts val="0"/>
+              </a:spcBef>
+              <a:buNone/>
+            </a:pPr>
+            <a:r>
+              <a:t/>
+            </a:r>
+            <a:endParaRPr/>
           </a:p>
         </p:txBody>
       </p:sp>
@@ -5957,6 +6052,10 @@
               <a:buNone/>
             </a:pPr>
             <a:r>
+              <a:rPr lang="en"/>
+              <a:t>Sentiment Analysis: </a:t>
+            </a:r>
+            <a:r>
               <a:rPr lang="en">
                 <a:solidFill>
                   <a:srgbClr val="4A86E8"/>
@@ -5971,10 +6070,6 @@
                 </a:solidFill>
               </a:rPr>
               <a:t>SQL</a:t>
-            </a:r>
-            <a:r>
-              <a:rPr lang="en"/>
-              <a:t> Query</a:t>
             </a:r>
           </a:p>
         </p:txBody>
@@ -5990,7 +6085,7 @@
         <p:spPr>
           <a:xfrm>
             <a:off x="311700" y="1225225"/>
-            <a:ext cx="8520599" cy="2084999"/>
+            <a:ext cx="8520599" cy="3354000"/>
           </a:xfrm>
           <a:prstGeom prst="rect">
             <a:avLst/>
@@ -6002,259 +6097,103 @@
           </a:bodyPr>
           <a:lstStyle/>
           <a:p>
-            <a:pPr rtl="0">
-              <a:spcBef>
-                <a:spcPts val="0"/>
-              </a:spcBef>
-              <a:buNone/>
-            </a:pPr>
-            <a:r>
-              <a:rPr lang="en">
-                <a:solidFill>
-                  <a:srgbClr val="0000FF"/>
-                </a:solidFill>
-              </a:rPr>
-              <a:t>SELECT</a:t>
-            </a:r>
+            <a:pPr indent="-228600" lvl="0" marL="457200" rtl="0">
+              <a:spcBef>
+                <a:spcPts val="0"/>
+              </a:spcBef>
+              <a:buChar char="➔"/>
+            </a:pPr>
             <a:r>
               <a:rPr lang="en"/>
-              <a:t> r.review, r.id, </a:t>
-            </a:r>
-            <a:r>
-              <a:rPr lang="en">
-                <a:solidFill>
-                  <a:srgbClr val="38761D"/>
-                </a:solidFill>
-              </a:rPr>
-              <a:t>CASE WHEN SUM</a:t>
-            </a:r>
+              <a:t>As per instructions, only schema and query implemented</a:t>
+            </a:r>
+          </a:p>
+          <a:p>
+            <a:pPr indent="-228600" lvl="0" marL="457200" rtl="0">
+              <a:spcBef>
+                <a:spcPts val="0"/>
+              </a:spcBef>
+              <a:buChar char="➔"/>
+            </a:pPr>
             <a:r>
               <a:rPr lang="en"/>
-              <a:t>(w.sentiment * s.`count`) &gt;= </a:t>
-            </a:r>
-            <a:r>
-              <a:rPr lang="en">
-                <a:solidFill>
-                  <a:srgbClr val="FF0000"/>
-                </a:solidFill>
-              </a:rPr>
-              <a:t>0</a:t>
-            </a:r>
-          </a:p>
-          <a:p>
-            <a:pPr rtl="0">
-              <a:spcBef>
-                <a:spcPts val="0"/>
-              </a:spcBef>
-              <a:buNone/>
+              <a:t>Code would be required to build the database from the JSON and txt files provided</a:t>
+            </a:r>
+          </a:p>
+          <a:p>
+            <a:pPr indent="-228600" lvl="0" marL="457200" rtl="0">
+              <a:spcBef>
+                <a:spcPts val="0"/>
+              </a:spcBef>
+              <a:buChar char="➔"/>
             </a:pPr>
             <a:r>
               <a:rPr lang="en"/>
-              <a:t>	</a:t>
-            </a:r>
-            <a:r>
-              <a:rPr lang="en">
-                <a:solidFill>
-                  <a:srgbClr val="38761D"/>
-                </a:solidFill>
-              </a:rPr>
-              <a:t>THEN</a:t>
-            </a:r>
+              <a:t>Schema very simple:</a:t>
+            </a:r>
+          </a:p>
+          <a:p>
+            <a:pPr indent="-228600" lvl="1" marL="914400" rtl="0">
+              <a:spcBef>
+                <a:spcPts val="0"/>
+              </a:spcBef>
+              <a:buChar char="◆"/>
+            </a:pPr>
             <a:r>
               <a:rPr lang="en"/>
-              <a:t> </a:t>
-            </a:r>
-            <a:r>
-              <a:rPr lang="en">
-                <a:solidFill>
-                  <a:srgbClr val="9900FF"/>
-                </a:solidFill>
-              </a:rPr>
-              <a:t>‘positive’</a:t>
-            </a:r>
+              <a:t>id and review content for each review</a:t>
+            </a:r>
+          </a:p>
+          <a:p>
+            <a:pPr indent="-228600" lvl="1" marL="914400" rtl="0">
+              <a:spcBef>
+                <a:spcPts val="0"/>
+              </a:spcBef>
+              <a:buChar char="◆"/>
+            </a:pPr>
             <a:r>
               <a:rPr lang="en"/>
-              <a:t> </a:t>
-            </a:r>
-            <a:r>
-              <a:rPr lang="en">
-                <a:solidFill>
-                  <a:srgbClr val="38761D"/>
-                </a:solidFill>
-              </a:rPr>
-              <a:t>ELSE</a:t>
-            </a:r>
+              <a:t>id foreign key, the word, and its count for each word</a:t>
+            </a:r>
+          </a:p>
+          <a:p>
+            <a:pPr indent="-228600" lvl="1" marL="914400" rtl="0">
+              <a:spcBef>
+                <a:spcPts val="0"/>
+              </a:spcBef>
+              <a:buChar char="◆"/>
+            </a:pPr>
             <a:r>
               <a:rPr lang="en"/>
-              <a:t> </a:t>
-            </a:r>
-            <a:r>
-              <a:rPr lang="en">
-                <a:solidFill>
-                  <a:srgbClr val="9900FF"/>
-                </a:solidFill>
-              </a:rPr>
-              <a:t>‘negative’ </a:t>
-            </a:r>
-            <a:r>
-              <a:rPr lang="en">
-                <a:solidFill>
-                  <a:srgbClr val="38761D"/>
-                </a:solidFill>
-              </a:rPr>
-              <a:t>END AS</a:t>
-            </a:r>
+              <a:t>sentiment value and word for each sentiment word (from * words.txt)</a:t>
+            </a:r>
+          </a:p>
+          <a:p>
+            <a:pPr indent="-228600" lvl="0" marL="457200" rtl="0">
+              <a:spcBef>
+                <a:spcPts val="0"/>
+              </a:spcBef>
+              <a:buChar char="➔"/>
+            </a:pPr>
             <a:r>
               <a:rPr lang="en"/>
-              <a:t> sentiment</a:t>
-            </a:r>
-          </a:p>
-          <a:p>
-            <a:pPr rtl="0">
-              <a:spcBef>
-                <a:spcPts val="0"/>
-              </a:spcBef>
-              <a:buNone/>
-            </a:pPr>
-            <a:r>
-              <a:rPr lang="en"/>
-              <a:t>	</a:t>
-            </a:r>
-            <a:r>
-              <a:rPr lang="en">
-                <a:solidFill>
-                  <a:srgbClr val="38761D"/>
-                </a:solidFill>
-              </a:rPr>
-              <a:t>FROM</a:t>
-            </a:r>
-            <a:r>
-              <a:rPr lang="en"/>
-              <a:t> unlabel_review r, unlabel_review_after_splitting s, words w</a:t>
-            </a:r>
-          </a:p>
-          <a:p>
-            <a:pPr>
-              <a:spcBef>
-                <a:spcPts val="0"/>
-              </a:spcBef>
-              <a:buNone/>
-            </a:pPr>
-            <a:r>
-              <a:rPr lang="en"/>
-              <a:t>	</a:t>
-            </a:r>
-            <a:r>
-              <a:rPr lang="en">
-                <a:solidFill>
-                  <a:srgbClr val="38761D"/>
-                </a:solidFill>
-              </a:rPr>
-              <a:t>WHERE</a:t>
-            </a:r>
-            <a:r>
-              <a:rPr lang="en"/>
-              <a:t> w.word = s.word </a:t>
-            </a:r>
-            <a:r>
-              <a:rPr lang="en">
-                <a:solidFill>
-                  <a:srgbClr val="38761D"/>
-                </a:solidFill>
-              </a:rPr>
-              <a:t>AND</a:t>
-            </a:r>
-            <a:r>
-              <a:rPr lang="en"/>
-              <a:t> r.id = s.id</a:t>
-            </a:r>
-          </a:p>
-        </p:txBody>
-      </p:sp>
-      <p:sp>
-        <p:nvSpPr>
-          <p:cNvPr id="90" name="Shape 90"/>
-          <p:cNvSpPr txBox="1"/>
-          <p:nvPr/>
-        </p:nvSpPr>
-        <p:spPr>
-          <a:xfrm>
-            <a:off x="311700" y="3423675"/>
-            <a:ext cx="8520599" cy="1453200"/>
-          </a:xfrm>
-          <a:prstGeom prst="rect">
-            <a:avLst/>
-          </a:prstGeom>
-          <a:noFill/>
-          <a:ln>
-            <a:noFill/>
-          </a:ln>
-        </p:spPr>
-        <p:txBody>
-          <a:bodyPr anchorCtr="0" anchor="t" bIns="91425" lIns="91425" rIns="91425" tIns="91425">
-            <a:noAutofit/>
-          </a:bodyPr>
-          <a:lstStyle/>
-          <a:p>
-            <a:pPr indent="-228600" lvl="0" marL="457200" rtl="0">
+              <a:t>After this, </a:t>
+            </a:r>
+            <a:r>
+              <a:rPr b="1" lang="en"/>
+              <a:t>all of the code can be performed in SQL</a:t>
+            </a:r>
+          </a:p>
+          <a:p>
+            <a:pPr indent="-228600" lvl="0" marL="457200">
               <a:spcBef>
                 <a:spcPts val="0"/>
               </a:spcBef>
               <a:buChar char="➔"/>
             </a:pPr>
             <a:r>
-              <a:rPr lang="en"/>
-              <a:t>Join each table and grab words that have sentiment values</a:t>
-            </a:r>
-          </a:p>
-          <a:p>
-            <a:pPr indent="-228600" lvl="1" marL="914400" rtl="0">
-              <a:spcBef>
-                <a:spcPts val="0"/>
-              </a:spcBef>
-              <a:buChar char="◆"/>
-            </a:pPr>
-            <a:r>
-              <a:rPr lang="en"/>
-              <a:t>+1 for positive, -1 for negative</a:t>
-            </a:r>
-          </a:p>
-          <a:p>
-            <a:pPr indent="-228600" lvl="0" marL="457200" rtl="0">
-              <a:spcBef>
-                <a:spcPts val="0"/>
-              </a:spcBef>
-              <a:buClr>
-                <a:schemeClr val="dk1"/>
-              </a:buClr>
-              <a:buChar char="➔"/>
-            </a:pPr>
-            <a:r>
-              <a:rPr lang="en">
-                <a:solidFill>
-                  <a:schemeClr val="dk1"/>
-                </a:solidFill>
-              </a:rPr>
-              <a:t>Sum the products of the sentiment values by the counts to determine the sentiment value of the review</a:t>
-            </a:r>
-          </a:p>
-          <a:p>
-            <a:pPr indent="-228600" lvl="0" marL="457200" rtl="0">
-              <a:spcBef>
-                <a:spcPts val="0"/>
-              </a:spcBef>
-              <a:buClr>
-                <a:schemeClr val="dk1"/>
-              </a:buClr>
-              <a:buChar char="➔"/>
-            </a:pPr>
-            <a:r>
-              <a:rPr lang="en">
-                <a:solidFill>
-                  <a:schemeClr val="dk1"/>
-                </a:solidFill>
-              </a:rPr>
-              <a:t>Use CASE WHEN...THEN...ELSE...END to return the string directly, and avoid the need for more code</a:t>
+              <a:rPr b="1" lang="en"/>
+              <a:t>~3 lines for the SQL query</a:t>
             </a:r>
           </a:p>
         </p:txBody>
@@ -6275,7 +6214,7 @@
   <p:cSld>
     <p:spTree>
       <p:nvGrpSpPr>
-        <p:cNvPr id="94" name="Shape 94"/>
+        <p:cNvPr id="93" name="Shape 93"/>
         <p:cNvGrpSpPr/>
         <p:nvPr/>
       </p:nvGrpSpPr>
@@ -6289,7 +6228,7 @@
       </p:grpSpPr>
       <p:sp>
         <p:nvSpPr>
-          <p:cNvPr id="95" name="Shape 95"/>
+          <p:cNvPr id="94" name="Shape 94"/>
           <p:cNvSpPr txBox="1"/>
           <p:nvPr>
             <p:ph type="title"/>
@@ -6334,23 +6273,199 @@
             </a:r>
             <a:r>
               <a:rPr lang="en"/>
-              <a:t> vs </a:t>
-            </a:r>
+              <a:t> Query</a:t>
+            </a:r>
+          </a:p>
+        </p:txBody>
+      </p:sp>
+      <p:sp>
+        <p:nvSpPr>
+          <p:cNvPr id="95" name="Shape 95"/>
+          <p:cNvSpPr txBox="1"/>
+          <p:nvPr>
+            <p:ph idx="1" type="body"/>
+          </p:nvPr>
+        </p:nvSpPr>
+        <p:spPr>
+          <a:xfrm>
+            <a:off x="311700" y="1225225"/>
+            <a:ext cx="8520599" cy="2084999"/>
+          </a:xfrm>
+          <a:prstGeom prst="rect">
+            <a:avLst/>
+          </a:prstGeom>
+        </p:spPr>
+        <p:txBody>
+          <a:bodyPr anchorCtr="0" anchor="t" bIns="91425" lIns="91425" rIns="91425" tIns="91425">
+            <a:noAutofit/>
+          </a:bodyPr>
+          <a:lstStyle/>
+          <a:p>
+            <a:pPr rtl="0">
+              <a:spcBef>
+                <a:spcPts val="0"/>
+              </a:spcBef>
+              <a:buNone/>
+            </a:pPr>
             <a:r>
               <a:rPr lang="en">
                 <a:solidFill>
-                  <a:schemeClr val="accent1"/>
+                  <a:srgbClr val="0000FF"/>
                 </a:solidFill>
               </a:rPr>
-              <a:t>Mongo</a:t>
+              <a:t>SELECT</a:t>
+            </a:r>
+            <a:r>
+              <a:rPr lang="en"/>
+              <a:t> r.review, r.id, </a:t>
             </a:r>
             <a:r>
               <a:rPr lang="en">
                 <a:solidFill>
-                  <a:schemeClr val="lt2"/>
+                  <a:srgbClr val="38761D"/>
                 </a:solidFill>
               </a:rPr>
-              <a:t>DB</a:t>
+              <a:t>CASE WHEN SUM</a:t>
+            </a:r>
+            <a:r>
+              <a:rPr lang="en"/>
+              <a:t>(w.sentiment * s.`count`) &gt;= </a:t>
+            </a:r>
+            <a:r>
+              <a:rPr lang="en">
+                <a:solidFill>
+                  <a:srgbClr val="FF0000"/>
+                </a:solidFill>
+              </a:rPr>
+              <a:t>0</a:t>
+            </a:r>
+          </a:p>
+          <a:p>
+            <a:pPr rtl="0">
+              <a:spcBef>
+                <a:spcPts val="0"/>
+              </a:spcBef>
+              <a:buNone/>
+            </a:pPr>
+            <a:r>
+              <a:rPr lang="en"/>
+              <a:t>	</a:t>
+            </a:r>
+            <a:r>
+              <a:rPr lang="en">
+                <a:solidFill>
+                  <a:srgbClr val="38761D"/>
+                </a:solidFill>
+              </a:rPr>
+              <a:t>THEN</a:t>
+            </a:r>
+            <a:r>
+              <a:rPr lang="en"/>
+              <a:t> </a:t>
+            </a:r>
+            <a:r>
+              <a:rPr lang="en">
+                <a:solidFill>
+                  <a:srgbClr val="9900FF"/>
+                </a:solidFill>
+              </a:rPr>
+              <a:t>‘positive’</a:t>
+            </a:r>
+            <a:r>
+              <a:rPr lang="en"/>
+              <a:t> </a:t>
+            </a:r>
+            <a:r>
+              <a:rPr lang="en">
+                <a:solidFill>
+                  <a:srgbClr val="38761D"/>
+                </a:solidFill>
+              </a:rPr>
+              <a:t>ELSE</a:t>
+            </a:r>
+            <a:r>
+              <a:rPr lang="en"/>
+              <a:t> </a:t>
+            </a:r>
+            <a:r>
+              <a:rPr lang="en">
+                <a:solidFill>
+                  <a:srgbClr val="9900FF"/>
+                </a:solidFill>
+              </a:rPr>
+              <a:t>‘negative’ </a:t>
+            </a:r>
+            <a:r>
+              <a:rPr lang="en">
+                <a:solidFill>
+                  <a:srgbClr val="38761D"/>
+                </a:solidFill>
+              </a:rPr>
+              <a:t>END AS</a:t>
+            </a:r>
+            <a:r>
+              <a:rPr lang="en"/>
+              <a:t> sentiment</a:t>
+            </a:r>
+          </a:p>
+          <a:p>
+            <a:pPr rtl="0">
+              <a:spcBef>
+                <a:spcPts val="0"/>
+              </a:spcBef>
+              <a:buNone/>
+            </a:pPr>
+            <a:r>
+              <a:rPr lang="en"/>
+              <a:t>	</a:t>
+            </a:r>
+            <a:r>
+              <a:rPr lang="en">
+                <a:solidFill>
+                  <a:srgbClr val="38761D"/>
+                </a:solidFill>
+              </a:rPr>
+              <a:t>FROM</a:t>
+            </a:r>
+            <a:r>
+              <a:rPr lang="en"/>
+              <a:t> unlabel_review r, unlabel_review_after_splitting s, words w</a:t>
+            </a:r>
+          </a:p>
+          <a:p>
+            <a:pPr>
+              <a:spcBef>
+                <a:spcPts val="0"/>
+              </a:spcBef>
+              <a:buNone/>
+            </a:pPr>
+            <a:r>
+              <a:rPr lang="en"/>
+              <a:t>	</a:t>
+            </a:r>
+            <a:r>
+              <a:rPr lang="en">
+                <a:solidFill>
+                  <a:srgbClr val="38761D"/>
+                </a:solidFill>
+              </a:rPr>
+              <a:t>WHERE</a:t>
+            </a:r>
+            <a:r>
+              <a:rPr lang="en"/>
+              <a:t> w.word = s.word </a:t>
+            </a:r>
+            <a:r>
+              <a:rPr lang="en">
+                <a:solidFill>
+                  <a:srgbClr val="38761D"/>
+                </a:solidFill>
+              </a:rPr>
+              <a:t>AND</a:t>
+            </a:r>
+            <a:r>
+              <a:rPr lang="en"/>
+              <a:t> r.id = s.id</a:t>
             </a:r>
           </a:p>
         </p:txBody>
@@ -6358,6 +6473,190 @@
       <p:sp>
         <p:nvSpPr>
           <p:cNvPr id="96" name="Shape 96"/>
+          <p:cNvSpPr txBox="1"/>
+          <p:nvPr/>
+        </p:nvSpPr>
+        <p:spPr>
+          <a:xfrm>
+            <a:off x="311700" y="3423675"/>
+            <a:ext cx="8520599" cy="1453200"/>
+          </a:xfrm>
+          <a:prstGeom prst="rect">
+            <a:avLst/>
+          </a:prstGeom>
+          <a:noFill/>
+          <a:ln>
+            <a:noFill/>
+          </a:ln>
+        </p:spPr>
+        <p:txBody>
+          <a:bodyPr anchorCtr="0" anchor="t" bIns="91425" lIns="91425" rIns="91425" tIns="91425">
+            <a:noAutofit/>
+          </a:bodyPr>
+          <a:lstStyle/>
+          <a:p>
+            <a:pPr indent="-228600" lvl="0" marL="457200" rtl="0">
+              <a:spcBef>
+                <a:spcPts val="0"/>
+              </a:spcBef>
+              <a:buChar char="➔"/>
+            </a:pPr>
+            <a:r>
+              <a:rPr lang="en"/>
+              <a:t>Join each table and grab words that have sentiment values</a:t>
+            </a:r>
+          </a:p>
+          <a:p>
+            <a:pPr indent="-228600" lvl="1" marL="914400" rtl="0">
+              <a:spcBef>
+                <a:spcPts val="0"/>
+              </a:spcBef>
+              <a:buChar char="◆"/>
+            </a:pPr>
+            <a:r>
+              <a:rPr lang="en"/>
+              <a:t>+1 for positive, -1 for negative</a:t>
+            </a:r>
+          </a:p>
+          <a:p>
+            <a:pPr indent="-228600" lvl="0" marL="457200" rtl="0">
+              <a:spcBef>
+                <a:spcPts val="0"/>
+              </a:spcBef>
+              <a:buClr>
+                <a:schemeClr val="dk1"/>
+              </a:buClr>
+              <a:buChar char="➔"/>
+            </a:pPr>
+            <a:r>
+              <a:rPr lang="en">
+                <a:solidFill>
+                  <a:schemeClr val="dk1"/>
+                </a:solidFill>
+              </a:rPr>
+              <a:t>Sum the products of the sentiment values by the counts to determine the sentiment value of the review</a:t>
+            </a:r>
+          </a:p>
+          <a:p>
+            <a:pPr indent="-228600" lvl="0" marL="457200" rtl="0">
+              <a:spcBef>
+                <a:spcPts val="0"/>
+              </a:spcBef>
+              <a:buClr>
+                <a:schemeClr val="dk1"/>
+              </a:buClr>
+              <a:buChar char="➔"/>
+            </a:pPr>
+            <a:r>
+              <a:rPr lang="en">
+                <a:solidFill>
+                  <a:schemeClr val="dk1"/>
+                </a:solidFill>
+              </a:rPr>
+              <a:t>Use CASE WHEN...THEN...ELSE...END to return the string directly, and avoid the need for more code</a:t>
+            </a:r>
+          </a:p>
+        </p:txBody>
+      </p:sp>
+    </p:spTree>
+  </p:cSld>
+  <p:clrMapOvr>
+    <a:masterClrMapping/>
+  </p:clrMapOvr>
+  <p:transition spd="slow">
+    <p:cut/>
+  </p:transition>
+</p:sld>
+</file>
+
+<file path=ppt/slides/slide8.xml><?xml version="1.0" encoding="utf-8"?>
+<p:sld xmlns:a="http://schemas.openxmlformats.org/drawingml/2006/main" xmlns:r="http://schemas.openxmlformats.org/officeDocument/2006/relationships" xmlns:mc="http://schemas.openxmlformats.org/markup-compatibility/2006" xmlns:mv="urn:schemas-microsoft-com:mac:vml" xmlns:p="http://schemas.openxmlformats.org/presentationml/2006/main" xmlns:c="http://schemas.openxmlformats.org/drawingml/2006/chart" xmlns:dgm="http://schemas.openxmlformats.org/drawingml/2006/diagram" xmlns:o="urn:schemas-microsoft-com:office:office" xmlns:v="urn:schemas-microsoft-com:vml" xmlns:pvml="urn:schemas-microsoft-com:office:powerpoint" xmlns:com="http://schemas.openxmlformats.org/drawingml/2006/compatibility" xmlns:p14="http://schemas.microsoft.com/office/powerpoint/2010/main">
+  <p:cSld>
+    <p:spTree>
+      <p:nvGrpSpPr>
+        <p:cNvPr id="100" name="Shape 100"/>
+        <p:cNvGrpSpPr/>
+        <p:nvPr/>
+      </p:nvGrpSpPr>
+      <p:grpSpPr>
+        <a:xfrm>
+          <a:off x="0" y="0"/>
+          <a:ext cx="0" cy="0"/>
+          <a:chOff x="0" y="0"/>
+          <a:chExt cx="0" cy="0"/>
+        </a:xfrm>
+      </p:grpSpPr>
+      <p:sp>
+        <p:nvSpPr>
+          <p:cNvPr id="101" name="Shape 101"/>
+          <p:cNvSpPr txBox="1"/>
+          <p:nvPr>
+            <p:ph type="title"/>
+          </p:nvPr>
+        </p:nvSpPr>
+        <p:spPr>
+          <a:xfrm>
+            <a:off x="311700" y="315925"/>
+            <a:ext cx="8520599" cy="831299"/>
+          </a:xfrm>
+          <a:prstGeom prst="rect">
+            <a:avLst/>
+          </a:prstGeom>
+        </p:spPr>
+        <p:txBody>
+          <a:bodyPr anchorCtr="0" anchor="b" bIns="91425" lIns="91425" rIns="91425" tIns="91425">
+            <a:noAutofit/>
+          </a:bodyPr>
+          <a:lstStyle/>
+          <a:p>
+            <a:pPr>
+              <a:spcBef>
+                <a:spcPts val="0"/>
+              </a:spcBef>
+              <a:buNone/>
+            </a:pPr>
+            <a:r>
+              <a:rPr lang="en">
+                <a:solidFill>
+                  <a:srgbClr val="4A86E8"/>
+                </a:solidFill>
+              </a:rPr>
+              <a:t>My</a:t>
+            </a:r>
+            <a:r>
+              <a:rPr lang="en">
+                <a:solidFill>
+                  <a:srgbClr val="FF9900"/>
+                </a:solidFill>
+              </a:rPr>
+              <a:t>SQL</a:t>
+            </a:r>
+            <a:r>
+              <a:rPr lang="en"/>
+              <a:t> vs </a:t>
+            </a:r>
+            <a:r>
+              <a:rPr lang="en">
+                <a:solidFill>
+                  <a:schemeClr val="accent1"/>
+                </a:solidFill>
+              </a:rPr>
+              <a:t>Mongo</a:t>
+            </a:r>
+            <a:r>
+              <a:rPr lang="en">
+                <a:solidFill>
+                  <a:schemeClr val="lt2"/>
+                </a:solidFill>
+              </a:rPr>
+              <a:t>DB</a:t>
+            </a:r>
+          </a:p>
+        </p:txBody>
+      </p:sp>
+      <p:sp>
+        <p:nvSpPr>
+          <p:cNvPr id="102" name="Shape 102"/>
           <p:cNvSpPr txBox="1"/>
           <p:nvPr>
             <p:ph idx="1" type="body"/>
@@ -6483,6 +6782,285 @@
 </file>
 
 <file path=ppt/theme/theme1.xml><?xml version="1.0" encoding="utf-8"?>
+<a:theme xmlns:a="http://schemas.openxmlformats.org/drawingml/2006/main" xmlns:r="http://schemas.openxmlformats.org/officeDocument/2006/relationships" name="Custom Theme">
+  <a:themeElements>
+    <a:clrScheme name="Default">
+      <a:dk1>
+        <a:srgbClr val="000000"/>
+      </a:dk1>
+      <a:lt1>
+        <a:srgbClr val="FFFFFF"/>
+      </a:lt1>
+      <a:dk2>
+        <a:srgbClr val="158158"/>
+      </a:dk2>
+      <a:lt2>
+        <a:srgbClr val="F3F3F3"/>
+      </a:lt2>
+      <a:accent1>
+        <a:srgbClr val="058DC7"/>
+      </a:accent1>
+      <a:accent2>
+        <a:srgbClr val="50B432"/>
+      </a:accent2>
+      <a:accent3>
+        <a:srgbClr val="ED561B"/>
+      </a:accent3>
+      <a:accent4>
+        <a:srgbClr val="EDEF00"/>
+      </a:accent4>
+      <a:accent5>
+        <a:srgbClr val="24CBE5"/>
+      </a:accent5>
+      <a:accent6>
+        <a:srgbClr val="64E572"/>
+      </a:accent6>
+      <a:hlink>
+        <a:srgbClr val="2200CC"/>
+      </a:hlink>
+      <a:folHlink>
+        <a:srgbClr val="551A8B"/>
+      </a:folHlink>
+    </a:clrScheme>
+    <a:fontScheme name="Office">
+      <a:majorFont>
+        <a:latin typeface="Arial"/>
+        <a:ea typeface=""/>
+        <a:cs typeface=""/>
+        <a:font script="Jpan" typeface="ＭＳ Ｐゴシック"/>
+        <a:font script="Hang" typeface="맑은 고딕"/>
+        <a:font script="Hans" typeface="宋体"/>
+        <a:font script="Hant" typeface="新細明體"/>
+        <a:font script="Arab" typeface="Times New Roman"/>
+        <a:font script="Hebr" typeface="Times New Roman"/>
+        <a:font script="Thai" typeface="Angsana New"/>
+        <a:font script="Ethi" typeface="Nyala"/>
+        <a:font script="Beng" typeface="Vrinda"/>
+        <a:font script="Gujr" typeface="Shruti"/>
+        <a:font script="Khmr" typeface="MoolBoran"/>
+        <a:font script="Knda" typeface="Tunga"/>
+        <a:font script="Guru" typeface="Raavi"/>
+        <a:font script="Cans" typeface="Euphemia"/>
+        <a:font script="Cher" typeface="Plantagenet Cherokee"/>
+        <a:font script="Yiii" typeface="Microsoft Yi Baiti"/>
+        <a:font script="Tibt" typeface="Microsoft Himalaya"/>
+        <a:font script="Thaa" typeface="MV Boli"/>
+        <a:font script="Deva" typeface="Mangal"/>
+        <a:font script="Telu" typeface="Gautami"/>
+        <a:font script="Taml" typeface="Latha"/>
+        <a:font script="Syrc" typeface="Estrangelo Edessa"/>
+        <a:font script="Orya" typeface="Kalinga"/>
+        <a:font script="Mlym" typeface="Kartika"/>
+        <a:font script="Laoo" typeface="DokChampa"/>
+        <a:font script="Sinh" typeface="Iskoola Pota"/>
+        <a:font script="Mong" typeface="Mongolian Baiti"/>
+        <a:font script="Viet" typeface="Times New Roman"/>
+        <a:font script="Uigh" typeface="Microsoft Uighur"/>
+        <a:font script="Geor" typeface="Sylfaen"/>
+      </a:majorFont>
+      <a:minorFont>
+        <a:latin typeface="Arial"/>
+        <a:ea typeface=""/>
+        <a:cs typeface=""/>
+        <a:font script="Jpan" typeface="ＭＳ Ｐゴシック"/>
+        <a:font script="Hang" typeface="맑은 고딕"/>
+        <a:font script="Hans" typeface="宋体"/>
+        <a:font script="Hant" typeface="新細明體"/>
+        <a:font script="Arab" typeface="Arial"/>
+        <a:font script="Hebr" typeface="Arial"/>
+        <a:font script="Thai" typeface="Cordia New"/>
+        <a:font script="Ethi" typeface="Nyala"/>
+        <a:font script="Beng" typeface="Vrinda"/>
+        <a:font script="Gujr" typeface="Shruti"/>
+        <a:font script="Khmr" typeface="DaunPenh"/>
+        <a:font script="Knda" typeface="Tunga"/>
+        <a:font script="Guru" typeface="Raavi"/>
+        <a:font script="Cans" typeface="Euphemia"/>
+        <a:font script="Cher" typeface="Plantagenet Cherokee"/>
+        <a:font script="Yiii" typeface="Microsoft Yi Baiti"/>
+        <a:font script="Tibt" typeface="Microsoft Himalaya"/>
+        <a:font script="Thaa" typeface="MV Boli"/>
+        <a:font script="Deva" typeface="Mangal"/>
+        <a:font script="Telu" typeface="Gautami"/>
+        <a:font script="Taml" typeface="Latha"/>
+        <a:font script="Syrc" typeface="Estrangelo Edessa"/>
+        <a:font script="Orya" typeface="Kalinga"/>
+        <a:font script="Mlym" typeface="Kartika"/>
+        <a:font script="Laoo" typeface="DokChampa"/>
+        <a:font script="Sinh" typeface="Iskoola Pota"/>
+        <a:font script="Mong" typeface="Mongolian Baiti"/>
+        <a:font script="Viet" typeface="Arial"/>
+        <a:font script="Uigh" typeface="Microsoft Uighur"/>
+        <a:font script="Geor" typeface="Sylfaen"/>
+      </a:minorFont>
+    </a:fontScheme>
+    <a:fmtScheme name="Office">
+      <a:fillStyleLst>
+        <a:solidFill>
+          <a:schemeClr val="phClr"/>
+        </a:solidFill>
+        <a:gradFill rotWithShape="1">
+          <a:gsLst>
+            <a:gs pos="0">
+              <a:schemeClr val="phClr">
+                <a:tint val="50000"/>
+                <a:satMod val="300000"/>
+              </a:schemeClr>
+            </a:gs>
+            <a:gs pos="35000">
+              <a:schemeClr val="phClr">
+                <a:tint val="37000"/>
+                <a:satMod val="300000"/>
+              </a:schemeClr>
+            </a:gs>
+            <a:gs pos="100000">
+              <a:schemeClr val="phClr">
+                <a:tint val="15000"/>
+                <a:satMod val="350000"/>
+              </a:schemeClr>
+            </a:gs>
+          </a:gsLst>
+          <a:lin ang="16200000" scaled="1"/>
+        </a:gradFill>
+        <a:gradFill rotWithShape="1">
+          <a:gsLst>
+            <a:gs pos="0">
+              <a:schemeClr val="phClr">
+                <a:tint val="100000"/>
+                <a:shade val="100000"/>
+                <a:satMod val="130000"/>
+              </a:schemeClr>
+            </a:gs>
+            <a:gs pos="100000">
+              <a:schemeClr val="phClr">
+                <a:tint val="50000"/>
+                <a:shade val="100000"/>
+                <a:satMod val="350000"/>
+              </a:schemeClr>
+            </a:gs>
+          </a:gsLst>
+          <a:lin ang="16200000" scaled="0"/>
+        </a:gradFill>
+      </a:fillStyleLst>
+      <a:lnStyleLst>
+        <a:ln w="9525" cap="flat" cmpd="sng" algn="ctr">
+          <a:solidFill>
+            <a:schemeClr val="phClr">
+              <a:shade val="95000"/>
+              <a:satMod val="105000"/>
+            </a:schemeClr>
+          </a:solidFill>
+          <a:prstDash val="solid"/>
+        </a:ln>
+        <a:ln w="25400" cap="flat" cmpd="sng" algn="ctr">
+          <a:solidFill>
+            <a:schemeClr val="phClr"/>
+          </a:solidFill>
+          <a:prstDash val="solid"/>
+        </a:ln>
+        <a:ln w="38100" cap="flat" cmpd="sng" algn="ctr">
+          <a:solidFill>
+            <a:schemeClr val="phClr"/>
+          </a:solidFill>
+          <a:prstDash val="solid"/>
+        </a:ln>
+      </a:lnStyleLst>
+      <a:effectStyleLst>
+        <a:effectStyle>
+          <a:effectLst>
+            <a:outerShdw blurRad="40000" dist="20000" dir="5400000" rotWithShape="0">
+              <a:srgbClr val="000000">
+                <a:alpha val="38000"/>
+              </a:srgbClr>
+            </a:outerShdw>
+          </a:effectLst>
+        </a:effectStyle>
+        <a:effectStyle>
+          <a:effectLst>
+            <a:outerShdw blurRad="40000" dist="23000" dir="5400000" rotWithShape="0">
+              <a:srgbClr val="000000">
+                <a:alpha val="35000"/>
+              </a:srgbClr>
+            </a:outerShdw>
+          </a:effectLst>
+        </a:effectStyle>
+        <a:effectStyle>
+          <a:effectLst>
+            <a:outerShdw blurRad="40000" dist="23000" dir="5400000" rotWithShape="0">
+              <a:srgbClr val="000000">
+                <a:alpha val="35000"/>
+              </a:srgbClr>
+            </a:outerShdw>
+          </a:effectLst>
+          <a:scene3d>
+            <a:camera prst="orthographicFront">
+              <a:rot lat="0" lon="0" rev="0"/>
+            </a:camera>
+            <a:lightRig rig="threePt" dir="t">
+              <a:rot lat="0" lon="0" rev="1200000"/>
+            </a:lightRig>
+          </a:scene3d>
+          <a:sp3d>
+            <a:bevelT w="63500" h="25400"/>
+          </a:sp3d>
+        </a:effectStyle>
+      </a:effectStyleLst>
+      <a:bgFillStyleLst>
+        <a:solidFill>
+          <a:schemeClr val="phClr"/>
+        </a:solidFill>
+        <a:gradFill rotWithShape="1">
+          <a:gsLst>
+            <a:gs pos="0">
+              <a:schemeClr val="phClr">
+                <a:tint val="40000"/>
+                <a:satMod val="350000"/>
+              </a:schemeClr>
+            </a:gs>
+            <a:gs pos="40000">
+              <a:schemeClr val="phClr">
+                <a:tint val="45000"/>
+                <a:shade val="99000"/>
+                <a:satMod val="350000"/>
+              </a:schemeClr>
+            </a:gs>
+            <a:gs pos="100000">
+              <a:schemeClr val="phClr">
+                <a:shade val="20000"/>
+                <a:satMod val="255000"/>
+              </a:schemeClr>
+            </a:gs>
+          </a:gsLst>
+          <a:path path="circle">
+            <a:fillToRect l="50000" t="-80000" r="50000" b="180000"/>
+          </a:path>
+        </a:gradFill>
+        <a:gradFill rotWithShape="1">
+          <a:gsLst>
+            <a:gs pos="0">
+              <a:schemeClr val="phClr">
+                <a:tint val="80000"/>
+                <a:satMod val="300000"/>
+              </a:schemeClr>
+            </a:gs>
+            <a:gs pos="100000">
+              <a:schemeClr val="phClr">
+                <a:shade val="30000"/>
+                <a:satMod val="200000"/>
+              </a:schemeClr>
+            </a:gs>
+          </a:gsLst>
+          <a:path path="circle">
+            <a:fillToRect l="50000" t="50000" r="50000" b="50000"/>
+          </a:path>
+        </a:gradFill>
+      </a:bgFillStyleLst>
+    </a:fmtScheme>
+  </a:themeElements>
+</a:theme>
+</file>
+
+<file path=ppt/theme/theme2.xml><?xml version="1.0" encoding="utf-8"?>
 <a:theme xmlns:a="http://schemas.openxmlformats.org/drawingml/2006/main" xmlns:r="http://schemas.openxmlformats.org/officeDocument/2006/relationships" name="luxe">
   <a:themeElements>
     <a:clrScheme name="Luxe">
@@ -6759,283 +7337,4 @@
     </a:fmtScheme>
   </a:themeElements>
 </a:theme>
-</file>
-
-<file path=ppt/theme/theme2.xml><?xml version="1.0" encoding="utf-8"?>
-<a:theme xmlns:a="http://schemas.openxmlformats.org/drawingml/2006/main" xmlns:r="http://schemas.openxmlformats.org/officeDocument/2006/relationships" name="Custom Theme">
-  <a:themeElements>
-    <a:clrScheme name="Default">
-      <a:dk1>
-        <a:srgbClr val="000000"/>
-      </a:dk1>
-      <a:lt1>
-        <a:srgbClr val="FFFFFF"/>
-      </a:lt1>
-      <a:dk2>
-        <a:srgbClr val="158158"/>
-      </a:dk2>
-      <a:lt2>
-        <a:srgbClr val="F3F3F3"/>
-      </a:lt2>
-      <a:accent1>
-        <a:srgbClr val="058DC7"/>
-      </a:accent1>
-      <a:accent2>
-        <a:srgbClr val="50B432"/>
-      </a:accent2>
-      <a:accent3>
-        <a:srgbClr val="ED561B"/>
-      </a:accent3>
-      <a:accent4>
-        <a:srgbClr val="EDEF00"/>
-      </a:accent4>
-      <a:accent5>
-        <a:srgbClr val="24CBE5"/>
-      </a:accent5>
-      <a:accent6>
-        <a:srgbClr val="64E572"/>
-      </a:accent6>
-      <a:hlink>
-        <a:srgbClr val="2200CC"/>
-      </a:hlink>
-      <a:folHlink>
-        <a:srgbClr val="551A8B"/>
-      </a:folHlink>
-    </a:clrScheme>
-    <a:fontScheme name="Office">
-      <a:majorFont>
-        <a:latin typeface="Arial"/>
-        <a:ea typeface=""/>
-        <a:cs typeface=""/>
-        <a:font script="Jpan" typeface="ＭＳ Ｐゴシック"/>
-        <a:font script="Hang" typeface="맑은 고딕"/>
-        <a:font script="Hans" typeface="宋体"/>
-        <a:font script="Hant" typeface="新細明體"/>
-        <a:font script="Arab" typeface="Times New Roman"/>
-        <a:font script="Hebr" typeface="Times New Roman"/>
-        <a:font script="Thai" typeface="Angsana New"/>
-        <a:font script="Ethi" typeface="Nyala"/>
-        <a:font script="Beng" typeface="Vrinda"/>
-        <a:font script="Gujr" typeface="Shruti"/>
-        <a:font script="Khmr" typeface="MoolBoran"/>
-        <a:font script="Knda" typeface="Tunga"/>
-        <a:font script="Guru" typeface="Raavi"/>
-        <a:font script="Cans" typeface="Euphemia"/>
-        <a:font script="Cher" typeface="Plantagenet Cherokee"/>
-        <a:font script="Yiii" typeface="Microsoft Yi Baiti"/>
-        <a:font script="Tibt" typeface="Microsoft Himalaya"/>
-        <a:font script="Thaa" typeface="MV Boli"/>
-        <a:font script="Deva" typeface="Mangal"/>
-        <a:font script="Telu" typeface="Gautami"/>
-        <a:font script="Taml" typeface="Latha"/>
-        <a:font script="Syrc" typeface="Estrangelo Edessa"/>
-        <a:font script="Orya" typeface="Kalinga"/>
-        <a:font script="Mlym" typeface="Kartika"/>
-        <a:font script="Laoo" typeface="DokChampa"/>
-        <a:font script="Sinh" typeface="Iskoola Pota"/>
-        <a:font script="Mong" typeface="Mongolian Baiti"/>
-        <a:font script="Viet" typeface="Times New Roman"/>
-        <a:font script="Uigh" typeface="Microsoft Uighur"/>
-        <a:font script="Geor" typeface="Sylfaen"/>
-      </a:majorFont>
-      <a:minorFont>
-        <a:latin typeface="Arial"/>
-        <a:ea typeface=""/>
-        <a:cs typeface=""/>
-        <a:font script="Jpan" typeface="ＭＳ Ｐゴシック"/>
-        <a:font script="Hang" typeface="맑은 고딕"/>
-        <a:font script="Hans" typeface="宋体"/>
-        <a:font script="Hant" typeface="新細明體"/>
-        <a:font script="Arab" typeface="Arial"/>
-        <a:font script="Hebr" typeface="Arial"/>
-        <a:font script="Thai" typeface="Cordia New"/>
-        <a:font script="Ethi" typeface="Nyala"/>
-        <a:font script="Beng" typeface="Vrinda"/>
-        <a:font script="Gujr" typeface="Shruti"/>
-        <a:font script="Khmr" typeface="DaunPenh"/>
-        <a:font script="Knda" typeface="Tunga"/>
-        <a:font script="Guru" typeface="Raavi"/>
-        <a:font script="Cans" typeface="Euphemia"/>
-        <a:font script="Cher" typeface="Plantagenet Cherokee"/>
-        <a:font script="Yiii" typeface="Microsoft Yi Baiti"/>
-        <a:font script="Tibt" typeface="Microsoft Himalaya"/>
-        <a:font script="Thaa" typeface="MV Boli"/>
-        <a:font script="Deva" typeface="Mangal"/>
-        <a:font script="Telu" typeface="Gautami"/>
-        <a:font script="Taml" typeface="Latha"/>
-        <a:font script="Syrc" typeface="Estrangelo Edessa"/>
-        <a:font script="Orya" typeface="Kalinga"/>
-        <a:font script="Mlym" typeface="Kartika"/>
-        <a:font script="Laoo" typeface="DokChampa"/>
-        <a:font script="Sinh" typeface="Iskoola Pota"/>
-        <a:font script="Mong" typeface="Mongolian Baiti"/>
-        <a:font script="Viet" typeface="Arial"/>
-        <a:font script="Uigh" typeface="Microsoft Uighur"/>
-        <a:font script="Geor" typeface="Sylfaen"/>
-      </a:minorFont>
-    </a:fontScheme>
-    <a:fmtScheme name="Office">
-      <a:fillStyleLst>
-        <a:solidFill>
-          <a:schemeClr val="phClr"/>
-        </a:solidFill>
-        <a:gradFill rotWithShape="1">
-          <a:gsLst>
-            <a:gs pos="0">
-              <a:schemeClr val="phClr">
-                <a:tint val="50000"/>
-                <a:satMod val="300000"/>
-              </a:schemeClr>
-            </a:gs>
-            <a:gs pos="35000">
-              <a:schemeClr val="phClr">
-                <a:tint val="37000"/>
-                <a:satMod val="300000"/>
-              </a:schemeClr>
-            </a:gs>
-            <a:gs pos="100000">
-              <a:schemeClr val="phClr">
-                <a:tint val="15000"/>
-                <a:satMod val="350000"/>
-              </a:schemeClr>
-            </a:gs>
-          </a:gsLst>
-          <a:lin ang="16200000" scaled="1"/>
-        </a:gradFill>
-        <a:gradFill rotWithShape="1">
-          <a:gsLst>
-            <a:gs pos="0">
-              <a:schemeClr val="phClr">
-                <a:tint val="100000"/>
-                <a:shade val="100000"/>
-                <a:satMod val="130000"/>
-              </a:schemeClr>
-            </a:gs>
-            <a:gs pos="100000">
-              <a:schemeClr val="phClr">
-                <a:tint val="50000"/>
-                <a:shade val="100000"/>
-                <a:satMod val="350000"/>
-              </a:schemeClr>
-            </a:gs>
-          </a:gsLst>
-          <a:lin ang="16200000" scaled="0"/>
-        </a:gradFill>
-      </a:fillStyleLst>
-      <a:lnStyleLst>
-        <a:ln w="9525" cap="flat" cmpd="sng" algn="ctr">
-          <a:solidFill>
-            <a:schemeClr val="phClr">
-              <a:shade val="95000"/>
-              <a:satMod val="105000"/>
-            </a:schemeClr>
-          </a:solidFill>
-          <a:prstDash val="solid"/>
-        </a:ln>
-        <a:ln w="25400" cap="flat" cmpd="sng" algn="ctr">
-          <a:solidFill>
-            <a:schemeClr val="phClr"/>
-          </a:solidFill>
-          <a:prstDash val="solid"/>
-        </a:ln>
-        <a:ln w="38100" cap="flat" cmpd="sng" algn="ctr">
-          <a:solidFill>
-            <a:schemeClr val="phClr"/>
-          </a:solidFill>
-          <a:prstDash val="solid"/>
-        </a:ln>
-      </a:lnStyleLst>
-      <a:effectStyleLst>
-        <a:effectStyle>
-          <a:effectLst>
-            <a:outerShdw blurRad="40000" dist="20000" dir="5400000" rotWithShape="0">
-              <a:srgbClr val="000000">
-                <a:alpha val="38000"/>
-              </a:srgbClr>
-            </a:outerShdw>
-          </a:effectLst>
-        </a:effectStyle>
-        <a:effectStyle>
-          <a:effectLst>
-            <a:outerShdw blurRad="40000" dist="23000" dir="5400000" rotWithShape="0">
-              <a:srgbClr val="000000">
-                <a:alpha val="35000"/>
-              </a:srgbClr>
-            </a:outerShdw>
-          </a:effectLst>
-        </a:effectStyle>
-        <a:effectStyle>
-          <a:effectLst>
-            <a:outerShdw blurRad="40000" dist="23000" dir="5400000" rotWithShape="0">
-              <a:srgbClr val="000000">
-                <a:alpha val="35000"/>
-              </a:srgbClr>
-            </a:outerShdw>
-          </a:effectLst>
-          <a:scene3d>
-            <a:camera prst="orthographicFront">
-              <a:rot lat="0" lon="0" rev="0"/>
-            </a:camera>
-            <a:lightRig rig="threePt" dir="t">
-              <a:rot lat="0" lon="0" rev="1200000"/>
-            </a:lightRig>
-          </a:scene3d>
-          <a:sp3d>
-            <a:bevelT w="63500" h="25400"/>
-          </a:sp3d>
-        </a:effectStyle>
-      </a:effectStyleLst>
-      <a:bgFillStyleLst>
-        <a:solidFill>
-          <a:schemeClr val="phClr"/>
-        </a:solidFill>
-        <a:gradFill rotWithShape="1">
-          <a:gsLst>
-            <a:gs pos="0">
-              <a:schemeClr val="phClr">
-                <a:tint val="40000"/>
-                <a:satMod val="350000"/>
-              </a:schemeClr>
-            </a:gs>
-            <a:gs pos="40000">
-              <a:schemeClr val="phClr">
-                <a:tint val="45000"/>
-                <a:shade val="99000"/>
-                <a:satMod val="350000"/>
-              </a:schemeClr>
-            </a:gs>
-            <a:gs pos="100000">
-              <a:schemeClr val="phClr">
-                <a:shade val="20000"/>
-                <a:satMod val="255000"/>
-              </a:schemeClr>
-            </a:gs>
-          </a:gsLst>
-          <a:path path="circle">
-            <a:fillToRect l="50000" t="-80000" r="50000" b="180000"/>
-          </a:path>
-        </a:gradFill>
-        <a:gradFill rotWithShape="1">
-          <a:gsLst>
-            <a:gs pos="0">
-              <a:schemeClr val="phClr">
-                <a:tint val="80000"/>
-                <a:satMod val="300000"/>
-              </a:schemeClr>
-            </a:gs>
-            <a:gs pos="100000">
-              <a:schemeClr val="phClr">
-                <a:shade val="30000"/>
-                <a:satMod val="200000"/>
-              </a:schemeClr>
-            </a:gs>
-          </a:gsLst>
-          <a:path path="circle">
-            <a:fillToRect l="50000" t="50000" r="50000" b="50000"/>
-          </a:path>
-        </a:gradFill>
-      </a:bgFillStyleLst>
-    </a:fmtScheme>
-  </a:themeElements>
-</a:theme>
 </file>
</xml_diff>